<commit_message>
Removed mentions of Tag Bus, removed prefix comment from 4.2 (devguide)
</commit_message>
<xml_diff>
--- a/Trunk/Presentations/A_Introduction to DCAF.pptx
+++ b/Trunk/Presentations/A_Introduction to DCAF.pptx
@@ -11607,7 +11607,7 @@
           <a:p>
             <a:r>
               <a:rPr lang="en-US" dirty="0"/>
-              <a:t>This code is common for any Tag Bus applications</a:t>
+              <a:t>This code is common for any DCAF applications</a:t>
             </a:r>
           </a:p>
           <a:p>
@@ -11936,7 +11936,7 @@
           <a:p>
             <a:r>
               <a:rPr lang="en-US" dirty="0"/>
-              <a:t>When to use tag bus framework</a:t>
+              <a:t>When should you use DCAF?</a:t>
             </a:r>
           </a:p>
         </p:txBody>

</xml_diff>